<commit_message>
Mise à jour brochage MIDI_DMX F767
</commit_message>
<xml_diff>
--- a/Maquettes/Elec_Num_Emb/MIDI_DMX_F767/brochage.pptx
+++ b/Maquettes/Elec_Num_Emb/MIDI_DMX_F767/brochage.pptx
@@ -205,7 +205,7 @@
           <a:p>
             <a:fld id="{DAC67291-13FB-4A85-9B62-8BED92F848C0}" type="datetimeFigureOut">
               <a:rPr lang="fr-FR" smtClean="0"/>
-              <a:t>05/02/2023</a:t>
+              <a:t>06/03/2023</a:t>
             </a:fld>
             <a:endParaRPr lang="fr-FR"/>
           </a:p>
@@ -787,7 +787,7 @@
           <a:p>
             <a:fld id="{9F9D7BD0-09ED-4241-9B50-84DC221E5746}" type="datetimeFigureOut">
               <a:rPr lang="fr-FR" smtClean="0"/>
-              <a:t>05/02/2023</a:t>
+              <a:t>06/03/2023</a:t>
             </a:fld>
             <a:endParaRPr lang="fr-FR"/>
           </a:p>
@@ -985,7 +985,7 @@
           <a:p>
             <a:fld id="{9F9D7BD0-09ED-4241-9B50-84DC221E5746}" type="datetimeFigureOut">
               <a:rPr lang="fr-FR" smtClean="0"/>
-              <a:t>05/02/2023</a:t>
+              <a:t>06/03/2023</a:t>
             </a:fld>
             <a:endParaRPr lang="fr-FR"/>
           </a:p>
@@ -1193,7 +1193,7 @@
           <a:p>
             <a:fld id="{9F9D7BD0-09ED-4241-9B50-84DC221E5746}" type="datetimeFigureOut">
               <a:rPr lang="fr-FR" smtClean="0"/>
-              <a:t>05/02/2023</a:t>
+              <a:t>06/03/2023</a:t>
             </a:fld>
             <a:endParaRPr lang="fr-FR"/>
           </a:p>
@@ -1391,7 +1391,7 @@
           <a:p>
             <a:fld id="{9F9D7BD0-09ED-4241-9B50-84DC221E5746}" type="datetimeFigureOut">
               <a:rPr lang="fr-FR" smtClean="0"/>
-              <a:t>05/02/2023</a:t>
+              <a:t>06/03/2023</a:t>
             </a:fld>
             <a:endParaRPr lang="fr-FR"/>
           </a:p>
@@ -1666,7 +1666,7 @@
           <a:p>
             <a:fld id="{9F9D7BD0-09ED-4241-9B50-84DC221E5746}" type="datetimeFigureOut">
               <a:rPr lang="fr-FR" smtClean="0"/>
-              <a:t>05/02/2023</a:t>
+              <a:t>06/03/2023</a:t>
             </a:fld>
             <a:endParaRPr lang="fr-FR"/>
           </a:p>
@@ -1931,7 +1931,7 @@
           <a:p>
             <a:fld id="{9F9D7BD0-09ED-4241-9B50-84DC221E5746}" type="datetimeFigureOut">
               <a:rPr lang="fr-FR" smtClean="0"/>
-              <a:t>05/02/2023</a:t>
+              <a:t>06/03/2023</a:t>
             </a:fld>
             <a:endParaRPr lang="fr-FR"/>
           </a:p>
@@ -2343,7 +2343,7 @@
           <a:p>
             <a:fld id="{9F9D7BD0-09ED-4241-9B50-84DC221E5746}" type="datetimeFigureOut">
               <a:rPr lang="fr-FR" smtClean="0"/>
-              <a:t>05/02/2023</a:t>
+              <a:t>06/03/2023</a:t>
             </a:fld>
             <a:endParaRPr lang="fr-FR"/>
           </a:p>
@@ -2484,7 +2484,7 @@
           <a:p>
             <a:fld id="{9F9D7BD0-09ED-4241-9B50-84DC221E5746}" type="datetimeFigureOut">
               <a:rPr lang="fr-FR" smtClean="0"/>
-              <a:t>05/02/2023</a:t>
+              <a:t>06/03/2023</a:t>
             </a:fld>
             <a:endParaRPr lang="fr-FR"/>
           </a:p>
@@ -2597,7 +2597,7 @@
           <a:p>
             <a:fld id="{9F9D7BD0-09ED-4241-9B50-84DC221E5746}" type="datetimeFigureOut">
               <a:rPr lang="fr-FR" smtClean="0"/>
-              <a:t>05/02/2023</a:t>
+              <a:t>06/03/2023</a:t>
             </a:fld>
             <a:endParaRPr lang="fr-FR"/>
           </a:p>
@@ -2908,7 +2908,7 @@
           <a:p>
             <a:fld id="{9F9D7BD0-09ED-4241-9B50-84DC221E5746}" type="datetimeFigureOut">
               <a:rPr lang="fr-FR" smtClean="0"/>
-              <a:t>05/02/2023</a:t>
+              <a:t>06/03/2023</a:t>
             </a:fld>
             <a:endParaRPr lang="fr-FR"/>
           </a:p>
@@ -3196,7 +3196,7 @@
           <a:p>
             <a:fld id="{9F9D7BD0-09ED-4241-9B50-84DC221E5746}" type="datetimeFigureOut">
               <a:rPr lang="fr-FR" smtClean="0"/>
-              <a:t>05/02/2023</a:t>
+              <a:t>06/03/2023</a:t>
             </a:fld>
             <a:endParaRPr lang="fr-FR"/>
           </a:p>
@@ -3437,7 +3437,7 @@
           <a:p>
             <a:fld id="{9F9D7BD0-09ED-4241-9B50-84DC221E5746}" type="datetimeFigureOut">
               <a:rPr lang="fr-FR" smtClean="0"/>
-              <a:t>05/02/2023</a:t>
+              <a:t>06/03/2023</a:t>
             </a:fld>
             <a:endParaRPr lang="fr-FR"/>
           </a:p>
@@ -13254,150 +13254,6 @@
           <a:chExt cx="0" cy="0"/>
         </a:xfrm>
       </p:grpSpPr>
-      <p:sp>
-        <p:nvSpPr>
-          <p:cNvPr id="3" name="ZoneTexte 2">
-            <a:extLst>
-              <a:ext uri="{FF2B5EF4-FFF2-40B4-BE49-F238E27FC236}">
-                <a16:creationId xmlns:a16="http://schemas.microsoft.com/office/drawing/2014/main" id="{3E22E5D6-3C47-0FEA-EBEA-6F411A5C7296}"/>
-              </a:ext>
-            </a:extLst>
-          </p:cNvPr>
-          <p:cNvSpPr txBox="1"/>
-          <p:nvPr/>
-        </p:nvSpPr>
-        <p:spPr>
-          <a:xfrm>
-            <a:off x="-5915478" y="4689528"/>
-            <a:ext cx="8874617" cy="1754326"/>
-          </a:xfrm>
-          <a:prstGeom prst="rect">
-            <a:avLst/>
-          </a:prstGeom>
-          <a:noFill/>
-        </p:spPr>
-        <p:txBody>
-          <a:bodyPr wrap="square">
-            <a:spAutoFit/>
-          </a:bodyPr>
-          <a:lstStyle/>
-          <a:p>
-            <a:r>
-              <a:rPr lang="fr-FR" sz="1800" dirty="0">
-                <a:solidFill>
-                  <a:srgbClr val="008000"/>
-                </a:solidFill>
-                <a:latin typeface="Consolas" panose="020B0609020204030204" pitchFamily="49" charset="0"/>
-              </a:rPr>
-              <a:t>/*      + MSGEQ7 : PD_14, PD_15, PA_4     */</a:t>
-            </a:r>
-            <a:endParaRPr lang="fr-FR" sz="1800" dirty="0">
-              <a:solidFill>
-                <a:srgbClr val="000000"/>
-              </a:solidFill>
-              <a:latin typeface="Consolas" panose="020B0609020204030204" pitchFamily="49" charset="0"/>
-            </a:endParaRPr>
-          </a:p>
-          <a:p>
-            <a:r>
-              <a:rPr lang="fr-FR" sz="1800" dirty="0">
-                <a:solidFill>
-                  <a:srgbClr val="008000"/>
-                </a:solidFill>
-                <a:latin typeface="Consolas" panose="020B0609020204030204" pitchFamily="49" charset="0"/>
-              </a:rPr>
-              <a:t>/*              (strobe, reset, </a:t>
-            </a:r>
-            <a:r>
-              <a:rPr lang="fr-FR" sz="1800" dirty="0" err="1">
-                <a:solidFill>
-                  <a:srgbClr val="008000"/>
-                </a:solidFill>
-                <a:latin typeface="Consolas" panose="020B0609020204030204" pitchFamily="49" charset="0"/>
-              </a:rPr>
-              <a:t>analog</a:t>
-            </a:r>
-            <a:r>
-              <a:rPr lang="fr-FR" sz="1800" dirty="0">
-                <a:solidFill>
-                  <a:srgbClr val="008000"/>
-                </a:solidFill>
-                <a:latin typeface="Consolas" panose="020B0609020204030204" pitchFamily="49" charset="0"/>
-              </a:rPr>
-              <a:t> out) */</a:t>
-            </a:r>
-            <a:endParaRPr lang="fr-FR" sz="1800" dirty="0">
-              <a:solidFill>
-                <a:srgbClr val="000000"/>
-              </a:solidFill>
-              <a:latin typeface="Consolas" panose="020B0609020204030204" pitchFamily="49" charset="0"/>
-            </a:endParaRPr>
-          </a:p>
-          <a:p>
-            <a:r>
-              <a:rPr lang="en-US" sz="1800" dirty="0">
-                <a:solidFill>
-                  <a:srgbClr val="008000"/>
-                </a:solidFill>
-                <a:latin typeface="Consolas" panose="020B0609020204030204" pitchFamily="49" charset="0"/>
-              </a:rPr>
-              <a:t>/*      + WS2812 led out : PC_8       */</a:t>
-            </a:r>
-            <a:endParaRPr lang="en-US" sz="1800" dirty="0">
-              <a:solidFill>
-                <a:srgbClr val="000000"/>
-              </a:solidFill>
-              <a:latin typeface="Consolas" panose="020B0609020204030204" pitchFamily="49" charset="0"/>
-            </a:endParaRPr>
-          </a:p>
-          <a:p>
-            <a:r>
-              <a:rPr lang="fr-FR" sz="1800" dirty="0">
-                <a:solidFill>
-                  <a:srgbClr val="008000"/>
-                </a:solidFill>
-                <a:latin typeface="Consolas" panose="020B0609020204030204" pitchFamily="49" charset="0"/>
-              </a:rPr>
-              <a:t>/*      + DAC1 out : PA_5        */</a:t>
-            </a:r>
-            <a:endParaRPr lang="fr-FR" sz="1800" dirty="0">
-              <a:solidFill>
-                <a:srgbClr val="000000"/>
-              </a:solidFill>
-              <a:latin typeface="Consolas" panose="020B0609020204030204" pitchFamily="49" charset="0"/>
-            </a:endParaRPr>
-          </a:p>
-          <a:p>
-            <a:r>
-              <a:rPr lang="fr-FR" sz="1800" dirty="0">
-                <a:solidFill>
-                  <a:srgbClr val="008000"/>
-                </a:solidFill>
-                <a:latin typeface="Consolas" panose="020B0609020204030204" pitchFamily="49" charset="0"/>
-              </a:rPr>
-              <a:t>/*      + HC-05 BT module : PD_1, PD_0 (uart4) */</a:t>
-            </a:r>
-            <a:endParaRPr lang="fr-FR" sz="1800" dirty="0">
-              <a:solidFill>
-                <a:srgbClr val="000000"/>
-              </a:solidFill>
-              <a:latin typeface="Consolas" panose="020B0609020204030204" pitchFamily="49" charset="0"/>
-            </a:endParaRPr>
-          </a:p>
-          <a:p>
-            <a:r>
-              <a:rPr lang="en-US" sz="1800" dirty="0">
-                <a:solidFill>
-                  <a:srgbClr val="008000"/>
-                </a:solidFill>
-                <a:latin typeface="Consolas" panose="020B0609020204030204" pitchFamily="49" charset="0"/>
-              </a:rPr>
-              <a:t>/*      + Digital In Pull-Down 1 to 4 : PA_7, PF_2, PF_1, PF_0    */</a:t>
-            </a:r>
-            <a:endParaRPr lang="fr-FR" dirty="0"/>
-          </a:p>
-        </p:txBody>
-      </p:sp>
       <p:pic>
         <p:nvPicPr>
           <p:cNvPr id="7" name="Image 6">
@@ -19560,6 +19416,150 @@
           </a:p>
         </p:txBody>
       </p:sp>
+      <p:sp>
+        <p:nvSpPr>
+          <p:cNvPr id="2" name="ZoneTexte 1">
+            <a:extLst>
+              <a:ext uri="{FF2B5EF4-FFF2-40B4-BE49-F238E27FC236}">
+                <a16:creationId xmlns:a16="http://schemas.microsoft.com/office/drawing/2014/main" id="{AE2BD85C-C09C-4CE6-ED4D-D1787BF51BA7}"/>
+              </a:ext>
+            </a:extLst>
+          </p:cNvPr>
+          <p:cNvSpPr txBox="1"/>
+          <p:nvPr/>
+        </p:nvSpPr>
+        <p:spPr>
+          <a:xfrm>
+            <a:off x="2936116" y="4968275"/>
+            <a:ext cx="8874617" cy="1754326"/>
+          </a:xfrm>
+          <a:prstGeom prst="rect">
+            <a:avLst/>
+          </a:prstGeom>
+          <a:noFill/>
+        </p:spPr>
+        <p:txBody>
+          <a:bodyPr wrap="square">
+            <a:spAutoFit/>
+          </a:bodyPr>
+          <a:lstStyle/>
+          <a:p>
+            <a:r>
+              <a:rPr lang="fr-FR" sz="1800" dirty="0">
+                <a:solidFill>
+                  <a:srgbClr val="008000"/>
+                </a:solidFill>
+                <a:latin typeface="Consolas" panose="020B0609020204030204" pitchFamily="49" charset="0"/>
+              </a:rPr>
+              <a:t>/*      + MSGEQ7 : PD_14, PD_15, PA_4     */</a:t>
+            </a:r>
+            <a:endParaRPr lang="fr-FR" sz="1800" dirty="0">
+              <a:solidFill>
+                <a:srgbClr val="000000"/>
+              </a:solidFill>
+              <a:latin typeface="Consolas" panose="020B0609020204030204" pitchFamily="49" charset="0"/>
+            </a:endParaRPr>
+          </a:p>
+          <a:p>
+            <a:r>
+              <a:rPr lang="fr-FR" sz="1800" dirty="0">
+                <a:solidFill>
+                  <a:srgbClr val="008000"/>
+                </a:solidFill>
+                <a:latin typeface="Consolas" panose="020B0609020204030204" pitchFamily="49" charset="0"/>
+              </a:rPr>
+              <a:t>/*              (strobe, reset, </a:t>
+            </a:r>
+            <a:r>
+              <a:rPr lang="fr-FR" sz="1800" dirty="0" err="1">
+                <a:solidFill>
+                  <a:srgbClr val="008000"/>
+                </a:solidFill>
+                <a:latin typeface="Consolas" panose="020B0609020204030204" pitchFamily="49" charset="0"/>
+              </a:rPr>
+              <a:t>analog</a:t>
+            </a:r>
+            <a:r>
+              <a:rPr lang="fr-FR" sz="1800" dirty="0">
+                <a:solidFill>
+                  <a:srgbClr val="008000"/>
+                </a:solidFill>
+                <a:latin typeface="Consolas" panose="020B0609020204030204" pitchFamily="49" charset="0"/>
+              </a:rPr>
+              <a:t> out) */</a:t>
+            </a:r>
+            <a:endParaRPr lang="fr-FR" sz="1800" dirty="0">
+              <a:solidFill>
+                <a:srgbClr val="000000"/>
+              </a:solidFill>
+              <a:latin typeface="Consolas" panose="020B0609020204030204" pitchFamily="49" charset="0"/>
+            </a:endParaRPr>
+          </a:p>
+          <a:p>
+            <a:r>
+              <a:rPr lang="en-US" sz="1800" dirty="0">
+                <a:solidFill>
+                  <a:srgbClr val="008000"/>
+                </a:solidFill>
+                <a:latin typeface="Consolas" panose="020B0609020204030204" pitchFamily="49" charset="0"/>
+              </a:rPr>
+              <a:t>/*      + WS2812 led out : PC_8       */</a:t>
+            </a:r>
+            <a:endParaRPr lang="en-US" sz="1800" dirty="0">
+              <a:solidFill>
+                <a:srgbClr val="000000"/>
+              </a:solidFill>
+              <a:latin typeface="Consolas" panose="020B0609020204030204" pitchFamily="49" charset="0"/>
+            </a:endParaRPr>
+          </a:p>
+          <a:p>
+            <a:r>
+              <a:rPr lang="fr-FR" sz="1800" dirty="0">
+                <a:solidFill>
+                  <a:srgbClr val="008000"/>
+                </a:solidFill>
+                <a:latin typeface="Consolas" panose="020B0609020204030204" pitchFamily="49" charset="0"/>
+              </a:rPr>
+              <a:t>/*      + DAC1 out : PA_5        */</a:t>
+            </a:r>
+            <a:endParaRPr lang="fr-FR" sz="1800" dirty="0">
+              <a:solidFill>
+                <a:srgbClr val="000000"/>
+              </a:solidFill>
+              <a:latin typeface="Consolas" panose="020B0609020204030204" pitchFamily="49" charset="0"/>
+            </a:endParaRPr>
+          </a:p>
+          <a:p>
+            <a:r>
+              <a:rPr lang="fr-FR" sz="1800" dirty="0">
+                <a:solidFill>
+                  <a:srgbClr val="008000"/>
+                </a:solidFill>
+                <a:latin typeface="Consolas" panose="020B0609020204030204" pitchFamily="49" charset="0"/>
+              </a:rPr>
+              <a:t>/*      + HC-05 BT module : PD_1, PD_0 (uart4) */</a:t>
+            </a:r>
+            <a:endParaRPr lang="fr-FR" sz="1800" dirty="0">
+              <a:solidFill>
+                <a:srgbClr val="000000"/>
+              </a:solidFill>
+              <a:latin typeface="Consolas" panose="020B0609020204030204" pitchFamily="49" charset="0"/>
+            </a:endParaRPr>
+          </a:p>
+          <a:p>
+            <a:r>
+              <a:rPr lang="en-US" sz="1800" dirty="0">
+                <a:solidFill>
+                  <a:srgbClr val="008000"/>
+                </a:solidFill>
+                <a:latin typeface="Consolas" panose="020B0609020204030204" pitchFamily="49" charset="0"/>
+              </a:rPr>
+              <a:t>/*      + Digital In Pull-Down 1 to 4 : PA_7, PF_2, PF_1, PF_0    */</a:t>
+            </a:r>
+            <a:endParaRPr lang="fr-FR" dirty="0"/>
+          </a:p>
+        </p:txBody>
+      </p:sp>
     </p:spTree>
     <p:extLst>
       <p:ext uri="{BB962C8B-B14F-4D97-AF65-F5344CB8AC3E}">
@@ -20950,289 +20950,6 @@
           </a:prstGeom>
         </p:spPr>
       </p:pic>
-      <p:sp>
-        <p:nvSpPr>
-          <p:cNvPr id="2" name="ZoneTexte 1">
-            <a:extLst>
-              <a:ext uri="{FF2B5EF4-FFF2-40B4-BE49-F238E27FC236}">
-                <a16:creationId xmlns:a16="http://schemas.microsoft.com/office/drawing/2014/main" id="{34AC1833-D5F5-697C-26A6-760088D4B652}"/>
-              </a:ext>
-            </a:extLst>
-          </p:cNvPr>
-          <p:cNvSpPr txBox="1"/>
-          <p:nvPr/>
-        </p:nvSpPr>
-        <p:spPr>
-          <a:xfrm>
-            <a:off x="-9980609" y="792543"/>
-            <a:ext cx="10656884" cy="3139321"/>
-          </a:xfrm>
-          <a:prstGeom prst="rect">
-            <a:avLst/>
-          </a:prstGeom>
-          <a:noFill/>
-        </p:spPr>
-        <p:txBody>
-          <a:bodyPr wrap="square">
-            <a:spAutoFit/>
-          </a:bodyPr>
-          <a:lstStyle/>
-          <a:p>
-            <a:r>
-              <a:rPr lang="da-DK" sz="1800" dirty="0">
-                <a:solidFill>
-                  <a:srgbClr val="008000"/>
-                </a:solidFill>
-                <a:latin typeface="Consolas" panose="020B0609020204030204" pitchFamily="49" charset="0"/>
-              </a:rPr>
-              <a:t>/*      + MIDI1 : PB_9, PB_8 (uart5)                                        */</a:t>
-            </a:r>
-            <a:endParaRPr lang="da-DK" sz="1800" dirty="0">
-              <a:solidFill>
-                <a:srgbClr val="000000"/>
-              </a:solidFill>
-              <a:latin typeface="Consolas" panose="020B0609020204030204" pitchFamily="49" charset="0"/>
-            </a:endParaRPr>
-          </a:p>
-          <a:p>
-            <a:r>
-              <a:rPr lang="fr-FR" sz="1800" dirty="0">
-                <a:solidFill>
-                  <a:srgbClr val="008000"/>
-                </a:solidFill>
-                <a:latin typeface="Consolas" panose="020B0609020204030204" pitchFamily="49" charset="0"/>
-              </a:rPr>
-              <a:t>/*      + MIDI2 : PG_14, PG_9 (uart6)                                       */</a:t>
-            </a:r>
-            <a:endParaRPr lang="fr-FR" sz="1800" dirty="0">
-              <a:solidFill>
-                <a:srgbClr val="000000"/>
-              </a:solidFill>
-              <a:latin typeface="Consolas" panose="020B0609020204030204" pitchFamily="49" charset="0"/>
-            </a:endParaRPr>
-          </a:p>
-          <a:p>
-            <a:r>
-              <a:rPr lang="en-US" sz="1800" dirty="0">
-                <a:solidFill>
-                  <a:srgbClr val="008000"/>
-                </a:solidFill>
-                <a:latin typeface="Consolas" panose="020B0609020204030204" pitchFamily="49" charset="0"/>
-              </a:rPr>
-              <a:t>/*      + MIDI3 (input only) : PE_1, PE_0 (uart8) */</a:t>
-            </a:r>
-            <a:endParaRPr lang="en-US" sz="1800" dirty="0">
-              <a:solidFill>
-                <a:srgbClr val="000000"/>
-              </a:solidFill>
-              <a:latin typeface="Consolas" panose="020B0609020204030204" pitchFamily="49" charset="0"/>
-            </a:endParaRPr>
-          </a:p>
-          <a:p>
-            <a:r>
-              <a:rPr lang="nb-NO" sz="1800" dirty="0">
-                <a:solidFill>
-                  <a:srgbClr val="008000"/>
-                </a:solidFill>
-                <a:latin typeface="Consolas" panose="020B0609020204030204" pitchFamily="49" charset="0"/>
-              </a:rPr>
-              <a:t>/*      + SD : PE_6, PE_5, PE_2, PE_3    (SPI4)                             */</a:t>
-            </a:r>
-            <a:endParaRPr lang="nb-NO" sz="1800" dirty="0">
-              <a:solidFill>
-                <a:srgbClr val="000000"/>
-              </a:solidFill>
-              <a:latin typeface="Consolas" panose="020B0609020204030204" pitchFamily="49" charset="0"/>
-            </a:endParaRPr>
-          </a:p>
-          <a:p>
-            <a:r>
-              <a:rPr lang="fr-FR" sz="1800" dirty="0">
-                <a:solidFill>
-                  <a:srgbClr val="008000"/>
-                </a:solidFill>
-                <a:latin typeface="Consolas" panose="020B0609020204030204" pitchFamily="49" charset="0"/>
-              </a:rPr>
-              <a:t>/*              (</a:t>
-            </a:r>
-            <a:r>
-              <a:rPr lang="fr-FR" sz="1800" dirty="0" err="1">
-                <a:solidFill>
-                  <a:srgbClr val="008000"/>
-                </a:solidFill>
-                <a:latin typeface="Consolas" panose="020B0609020204030204" pitchFamily="49" charset="0"/>
-              </a:rPr>
-              <a:t>mosi</a:t>
-            </a:r>
-            <a:r>
-              <a:rPr lang="fr-FR" sz="1800" dirty="0">
-                <a:solidFill>
-                  <a:srgbClr val="008000"/>
-                </a:solidFill>
-                <a:latin typeface="Consolas" panose="020B0609020204030204" pitchFamily="49" charset="0"/>
-              </a:rPr>
-              <a:t>, miso, </a:t>
-            </a:r>
-            <a:r>
-              <a:rPr lang="fr-FR" sz="1800" dirty="0" err="1">
-                <a:solidFill>
-                  <a:srgbClr val="008000"/>
-                </a:solidFill>
-                <a:latin typeface="Consolas" panose="020B0609020204030204" pitchFamily="49" charset="0"/>
-              </a:rPr>
-              <a:t>sck</a:t>
-            </a:r>
-            <a:r>
-              <a:rPr lang="fr-FR" sz="1800" dirty="0">
-                <a:solidFill>
-                  <a:srgbClr val="008000"/>
-                </a:solidFill>
-                <a:latin typeface="Consolas" panose="020B0609020204030204" pitchFamily="49" charset="0"/>
-              </a:rPr>
-              <a:t>, </a:t>
-            </a:r>
-            <a:r>
-              <a:rPr lang="fr-FR" sz="1800" dirty="0" err="1">
-                <a:solidFill>
-                  <a:srgbClr val="008000"/>
-                </a:solidFill>
-                <a:latin typeface="Consolas" panose="020B0609020204030204" pitchFamily="49" charset="0"/>
-              </a:rPr>
-              <a:t>cs</a:t>
-            </a:r>
-            <a:r>
-              <a:rPr lang="fr-FR" sz="1800" dirty="0">
-                <a:solidFill>
-                  <a:srgbClr val="008000"/>
-                </a:solidFill>
-                <a:latin typeface="Consolas" panose="020B0609020204030204" pitchFamily="49" charset="0"/>
-              </a:rPr>
-              <a:t>)                                       */</a:t>
-            </a:r>
-            <a:endParaRPr lang="fr-FR" sz="1800" dirty="0">
-              <a:solidFill>
-                <a:srgbClr val="000000"/>
-              </a:solidFill>
-              <a:latin typeface="Consolas" panose="020B0609020204030204" pitchFamily="49" charset="0"/>
-            </a:endParaRPr>
-          </a:p>
-          <a:p>
-            <a:r>
-              <a:rPr lang="fr-FR" sz="1800" dirty="0">
-                <a:solidFill>
-                  <a:srgbClr val="008000"/>
-                </a:solidFill>
-                <a:latin typeface="Consolas" panose="020B0609020204030204" pitchFamily="49" charset="0"/>
-              </a:rPr>
-              <a:t>/*      + MSGEQ7 : PD_14, PD_15, PA_4                                       */</a:t>
-            </a:r>
-            <a:endParaRPr lang="fr-FR" sz="1800" dirty="0">
-              <a:solidFill>
-                <a:srgbClr val="000000"/>
-              </a:solidFill>
-              <a:latin typeface="Consolas" panose="020B0609020204030204" pitchFamily="49" charset="0"/>
-            </a:endParaRPr>
-          </a:p>
-          <a:p>
-            <a:r>
-              <a:rPr lang="fr-FR" sz="1800" dirty="0">
-                <a:solidFill>
-                  <a:srgbClr val="008000"/>
-                </a:solidFill>
-                <a:latin typeface="Consolas" panose="020B0609020204030204" pitchFamily="49" charset="0"/>
-              </a:rPr>
-              <a:t>/*              (strobe, reset, </a:t>
-            </a:r>
-            <a:r>
-              <a:rPr lang="fr-FR" sz="1800" dirty="0" err="1">
-                <a:solidFill>
-                  <a:srgbClr val="008000"/>
-                </a:solidFill>
-                <a:latin typeface="Consolas" panose="020B0609020204030204" pitchFamily="49" charset="0"/>
-              </a:rPr>
-              <a:t>analog</a:t>
-            </a:r>
-            <a:r>
-              <a:rPr lang="fr-FR" sz="1800" dirty="0">
-                <a:solidFill>
-                  <a:srgbClr val="008000"/>
-                </a:solidFill>
-                <a:latin typeface="Consolas" panose="020B0609020204030204" pitchFamily="49" charset="0"/>
-              </a:rPr>
-              <a:t> out)                                 */</a:t>
-            </a:r>
-            <a:endParaRPr lang="fr-FR" sz="1800" dirty="0">
-              <a:solidFill>
-                <a:srgbClr val="000000"/>
-              </a:solidFill>
-              <a:latin typeface="Consolas" panose="020B0609020204030204" pitchFamily="49" charset="0"/>
-            </a:endParaRPr>
-          </a:p>
-          <a:p>
-            <a:r>
-              <a:rPr lang="en-US" sz="1800" dirty="0">
-                <a:solidFill>
-                  <a:srgbClr val="008000"/>
-                </a:solidFill>
-                <a:latin typeface="Consolas" panose="020B0609020204030204" pitchFamily="49" charset="0"/>
-              </a:rPr>
-              <a:t>/*      + WS2812 led out : PC_8                                             */</a:t>
-            </a:r>
-            <a:endParaRPr lang="en-US" sz="1800" dirty="0">
-              <a:solidFill>
-                <a:srgbClr val="000000"/>
-              </a:solidFill>
-              <a:latin typeface="Consolas" panose="020B0609020204030204" pitchFamily="49" charset="0"/>
-            </a:endParaRPr>
-          </a:p>
-          <a:p>
-            <a:r>
-              <a:rPr lang="fr-FR" sz="1800" dirty="0">
-                <a:solidFill>
-                  <a:srgbClr val="008000"/>
-                </a:solidFill>
-                <a:latin typeface="Consolas" panose="020B0609020204030204" pitchFamily="49" charset="0"/>
-              </a:rPr>
-              <a:t>/*      + DAC1 out : PA_5                                                   */</a:t>
-            </a:r>
-            <a:endParaRPr lang="fr-FR" sz="1800" dirty="0">
-              <a:solidFill>
-                <a:srgbClr val="000000"/>
-              </a:solidFill>
-              <a:latin typeface="Consolas" panose="020B0609020204030204" pitchFamily="49" charset="0"/>
-            </a:endParaRPr>
-          </a:p>
-          <a:p>
-            <a:r>
-              <a:rPr lang="fr-FR" sz="1800" dirty="0">
-                <a:solidFill>
-                  <a:srgbClr val="008000"/>
-                </a:solidFill>
-                <a:latin typeface="Consolas" panose="020B0609020204030204" pitchFamily="49" charset="0"/>
-              </a:rPr>
-              <a:t>/*      + HC-05 BT module : PD_1, PD_0 (uart4)                              */</a:t>
-            </a:r>
-            <a:endParaRPr lang="fr-FR" sz="1800" dirty="0">
-              <a:solidFill>
-                <a:srgbClr val="000000"/>
-              </a:solidFill>
-              <a:latin typeface="Consolas" panose="020B0609020204030204" pitchFamily="49" charset="0"/>
-            </a:endParaRPr>
-          </a:p>
-          <a:p>
-            <a:r>
-              <a:rPr lang="en-US" sz="1800" dirty="0">
-                <a:solidFill>
-                  <a:srgbClr val="008000"/>
-                </a:solidFill>
-                <a:latin typeface="Consolas" panose="020B0609020204030204" pitchFamily="49" charset="0"/>
-              </a:rPr>
-              <a:t>/*      + Digital In Pull-Down 1 to 4 : PA_7, PF_2, PF_1, PF_0              */</a:t>
-            </a:r>
-            <a:endParaRPr lang="fr-FR" dirty="0"/>
-          </a:p>
-        </p:txBody>
-      </p:sp>
     </p:spTree>
     <p:extLst>
       <p:ext uri="{BB962C8B-B14F-4D97-AF65-F5344CB8AC3E}">

</xml_diff>